<commit_message>
Ppt halfway done updates
</commit_message>
<xml_diff>
--- a/Review 1/Career Guidance using RAG.pptx
+++ b/Review 1/Career Guidance using RAG.pptx
@@ -34067,6 +34067,14 @@
 </file>
 
 <file path=customXml/item1.xml><?xml version="1.0" encoding="utf-8"?>
+<p:properties xmlns:p="http://schemas.microsoft.com/office/2006/metadata/properties" xmlns:xsi="http://www.w3.org/2001/XMLSchema-instance" xmlns:pc="http://schemas.microsoft.com/office/infopath/2007/PartnerControls">
+  <documentManagement>
+    <_activity xmlns="e3884598-6334-41dd-8084-a9ad116ca114" xsi:nil="true"/>
+  </documentManagement>
+</p:properties>
+</file>
+
+<file path=customXml/item2.xml><?xml version="1.0" encoding="utf-8"?>
 <ct:contentTypeSchema xmlns:ct="http://schemas.microsoft.com/office/2006/metadata/contentType" xmlns:ma="http://schemas.microsoft.com/office/2006/metadata/properties/metaAttributes" ct:_="" ma:_="" ma:contentTypeName="Document" ma:contentTypeID="0x01010025F8B0AEA918524F9C7920D6B663C371" ma:contentTypeVersion="14" ma:contentTypeDescription="Create a new document." ma:contentTypeScope="" ma:versionID="f1b7e37867f26bbadf41589433e36829">
   <xsd:schema xmlns:xsd="http://www.w3.org/2001/XMLSchema" xmlns:xs="http://www.w3.org/2001/XMLSchema" xmlns:p="http://schemas.microsoft.com/office/2006/metadata/properties" xmlns:ns3="e3884598-6334-41dd-8084-a9ad116ca114" xmlns:ns4="e2eeb589-0d24-46cf-8753-b27ea497333f" targetNamespace="http://schemas.microsoft.com/office/2006/metadata/properties" ma:root="true" ma:fieldsID="d0f5b427ea9598ba1906e02f5ef779d7" ns3:_="" ns4:_="">
     <xsd:import namespace="e3884598-6334-41dd-8084-a9ad116ca114"/>
@@ -34295,14 +34303,6 @@
 </ct:contentTypeSchema>
 </file>
 
-<file path=customXml/item2.xml><?xml version="1.0" encoding="utf-8"?>
-<p:properties xmlns:p="http://schemas.microsoft.com/office/2006/metadata/properties" xmlns:xsi="http://www.w3.org/2001/XMLSchema-instance" xmlns:pc="http://schemas.microsoft.com/office/infopath/2007/PartnerControls">
-  <documentManagement>
-    <_activity xmlns="e3884598-6334-41dd-8084-a9ad116ca114" xsi:nil="true"/>
-  </documentManagement>
-</p:properties>
-</file>
-
 <file path=customXml/item3.xml><?xml version="1.0" encoding="utf-8"?>
 <?mso-contentType ?>
 <FormTemplates xmlns="http://schemas.microsoft.com/sharepoint/v3/contenttype/forms">
@@ -34313,6 +34313,23 @@
 </file>
 
 <file path=customXml/itemProps1.xml><?xml version="1.0" encoding="utf-8"?>
+<ds:datastoreItem xmlns:ds="http://schemas.openxmlformats.org/officeDocument/2006/customXml" ds:itemID="{3E112386-D940-42B4-A6FD-F85DCFD0194C}">
+  <ds:schemaRefs>
+    <ds:schemaRef ds:uri="http://purl.org/dc/elements/1.1/"/>
+    <ds:schemaRef ds:uri="http://www.w3.org/XML/1998/namespace"/>
+    <ds:schemaRef ds:uri="http://purl.org/dc/dcmitype/"/>
+    <ds:schemaRef ds:uri="http://schemas.openxmlformats.org/package/2006/metadata/core-properties"/>
+    <ds:schemaRef ds:uri="http://schemas.microsoft.com/office/2006/metadata/properties"/>
+    <ds:schemaRef ds:uri="http://schemas.microsoft.com/office/2006/documentManagement/types"/>
+    <ds:schemaRef ds:uri="e2eeb589-0d24-46cf-8753-b27ea497333f"/>
+    <ds:schemaRef ds:uri="e3884598-6334-41dd-8084-a9ad116ca114"/>
+    <ds:schemaRef ds:uri="http://schemas.microsoft.com/office/infopath/2007/PartnerControls"/>
+    <ds:schemaRef ds:uri="http://purl.org/dc/terms/"/>
+  </ds:schemaRefs>
+</ds:datastoreItem>
+</file>
+
+<file path=customXml/itemProps2.xml><?xml version="1.0" encoding="utf-8"?>
 <ds:datastoreItem xmlns:ds="http://schemas.openxmlformats.org/officeDocument/2006/customXml" ds:itemID="{069A44A0-1A0D-4326-8463-7112F09D4782}">
   <ds:schemaRefs>
     <ds:schemaRef ds:uri="http://schemas.microsoft.com/office/2006/metadata/contentType"/>
@@ -34331,23 +34348,6 @@
 </ds:datastoreItem>
 </file>
 
-<file path=customXml/itemProps2.xml><?xml version="1.0" encoding="utf-8"?>
-<ds:datastoreItem xmlns:ds="http://schemas.openxmlformats.org/officeDocument/2006/customXml" ds:itemID="{3E112386-D940-42B4-A6FD-F85DCFD0194C}">
-  <ds:schemaRefs>
-    <ds:schemaRef ds:uri="http://purl.org/dc/elements/1.1/"/>
-    <ds:schemaRef ds:uri="http://www.w3.org/XML/1998/namespace"/>
-    <ds:schemaRef ds:uri="http://purl.org/dc/dcmitype/"/>
-    <ds:schemaRef ds:uri="http://schemas.openxmlformats.org/package/2006/metadata/core-properties"/>
-    <ds:schemaRef ds:uri="http://schemas.microsoft.com/office/2006/metadata/properties"/>
-    <ds:schemaRef ds:uri="http://schemas.microsoft.com/office/2006/documentManagement/types"/>
-    <ds:schemaRef ds:uri="e2eeb589-0d24-46cf-8753-b27ea497333f"/>
-    <ds:schemaRef ds:uri="e3884598-6334-41dd-8084-a9ad116ca114"/>
-    <ds:schemaRef ds:uri="http://schemas.microsoft.com/office/infopath/2007/PartnerControls"/>
-    <ds:schemaRef ds:uri="http://purl.org/dc/terms/"/>
-  </ds:schemaRefs>
-</ds:datastoreItem>
-</file>
-
 <file path=customXml/itemProps3.xml><?xml version="1.0" encoding="utf-8"?>
 <ds:datastoreItem xmlns:ds="http://schemas.openxmlformats.org/officeDocument/2006/customXml" ds:itemID="{FCE46A00-F07F-4CF6-BFF7-4B800BB968A1}">
   <ds:schemaRefs>

</xml_diff>